<commit_message>
Added homework to the slide deck.
</commit_message>
<xml_diff>
--- a/Lectures/Class2_WhatIsDataViz.pptx
+++ b/Lectures/Class2_WhatIsDataViz.pptx
@@ -15,6 +15,7 @@
     <p:sldId id="262" r:id="rId9"/>
     <p:sldId id="263" r:id="rId10"/>
     <p:sldId id="264" r:id="rId11"/>
+    <p:sldId id="266" r:id="rId12"/>
   </p:sldIdLst>
   <p:sldSz cx="9144000" cy="6858000" type="screen4x3"/>
   <p:notesSz cx="6858000" cy="9144000"/>
@@ -3216,7 +3217,7 @@
         <p:spPr/>
         <p:txBody>
           <a:bodyPr>
-            <a:normAutofit fontScale="92500" lnSpcReduction="10000"/>
+            <a:normAutofit/>
           </a:bodyPr>
           <a:lstStyle/>
           <a:p>
@@ -3254,27 +3255,6 @@
               <a:rPr lang="en-US" dirty="0" smtClean="0"/>
               <a:t>What did you take away from this? </a:t>
             </a:r>
-          </a:p>
-          <a:p>
-            <a:r>
-              <a:rPr lang="en-US" dirty="0" smtClean="0"/>
-              <a:t>For next class, read Kevin </a:t>
-            </a:r>
-            <a:r>
-              <a:rPr lang="en-US" dirty="0" err="1" smtClean="0"/>
-              <a:t>Quealy’s</a:t>
-            </a:r>
-            <a:r>
-              <a:rPr lang="en-US" dirty="0" smtClean="0"/>
-              <a:t> post on this (third link in your Google search).</a:t>
-            </a:r>
-          </a:p>
-          <a:p>
-            <a:r>
-              <a:rPr lang="en-US" dirty="0" smtClean="0"/>
-              <a:t>Note the process.</a:t>
-            </a:r>
-            <a:endParaRPr lang="en-US" dirty="0"/>
           </a:p>
         </p:txBody>
       </p:sp>
@@ -3282,6 +3262,131 @@
     <p:extLst>
       <p:ext uri="{BB962C8B-B14F-4D97-AF65-F5344CB8AC3E}">
         <p14:creationId xmlns:p14="http://schemas.microsoft.com/office/powerpoint/2010/main" val="276101938"/>
+      </p:ext>
+    </p:extLst>
+  </p:cSld>
+  <p:clrMapOvr>
+    <a:masterClrMapping/>
+  </p:clrMapOvr>
+</p:sld>
+</file>
+
+<file path=ppt/slides/slide11.xml><?xml version="1.0" encoding="utf-8"?>
+<p:sld xmlns:a="http://schemas.openxmlformats.org/drawingml/2006/main" xmlns:r="http://schemas.openxmlformats.org/officeDocument/2006/relationships" xmlns:p="http://schemas.openxmlformats.org/presentationml/2006/main">
+  <p:cSld>
+    <p:spTree>
+      <p:nvGrpSpPr>
+        <p:cNvPr id="1" name=""/>
+        <p:cNvGrpSpPr/>
+        <p:nvPr/>
+      </p:nvGrpSpPr>
+      <p:grpSpPr>
+        <a:xfrm>
+          <a:off x="0" y="0"/>
+          <a:ext cx="0" cy="0"/>
+          <a:chOff x="0" y="0"/>
+          <a:chExt cx="0" cy="0"/>
+        </a:xfrm>
+      </p:grpSpPr>
+      <p:sp>
+        <p:nvSpPr>
+          <p:cNvPr id="2" name="Title 1"/>
+          <p:cNvSpPr>
+            <a:spLocks noGrp="1"/>
+          </p:cNvSpPr>
+          <p:nvPr>
+            <p:ph type="title"/>
+          </p:nvPr>
+        </p:nvSpPr>
+        <p:spPr/>
+        <p:txBody>
+          <a:bodyPr/>
+          <a:lstStyle/>
+          <a:p>
+            <a:r>
+              <a:rPr lang="en-US" dirty="0" smtClean="0"/>
+              <a:t>Homework</a:t>
+            </a:r>
+            <a:endParaRPr lang="en-US" dirty="0"/>
+          </a:p>
+        </p:txBody>
+      </p:sp>
+      <p:sp>
+        <p:nvSpPr>
+          <p:cNvPr id="3" name="Content Placeholder 2"/>
+          <p:cNvSpPr>
+            <a:spLocks noGrp="1"/>
+          </p:cNvSpPr>
+          <p:nvPr>
+            <p:ph idx="1"/>
+          </p:nvPr>
+        </p:nvSpPr>
+        <p:spPr/>
+        <p:txBody>
+          <a:bodyPr>
+            <a:normAutofit/>
+          </a:bodyPr>
+          <a:lstStyle/>
+          <a:p>
+            <a:r>
+              <a:rPr lang="en-US" dirty="0" smtClean="0"/>
+              <a:t>Read </a:t>
+            </a:r>
+            <a:r>
+              <a:rPr lang="en-US" dirty="0" err="1" smtClean="0"/>
+              <a:t>Tufte</a:t>
+            </a:r>
+            <a:r>
+              <a:rPr lang="en-US" dirty="0" smtClean="0"/>
+              <a:t> Chapter 1 Part 1 on Graphical Excellence (pg. 13-51).</a:t>
+            </a:r>
+          </a:p>
+          <a:p>
+            <a:r>
+              <a:rPr lang="en-US" dirty="0" smtClean="0"/>
+              <a:t>Read Kevin </a:t>
+            </a:r>
+            <a:r>
+              <a:rPr lang="en-US" dirty="0" err="1" smtClean="0"/>
+              <a:t>Quealy’s</a:t>
+            </a:r>
+            <a:r>
+              <a:rPr lang="en-US" dirty="0" smtClean="0"/>
+              <a:t> post on </a:t>
+            </a:r>
+            <a:r>
+              <a:rPr lang="en-US" dirty="0" err="1" smtClean="0"/>
+              <a:t>chartsnthings</a:t>
+            </a:r>
+            <a:r>
+              <a:rPr lang="en-US" dirty="0" smtClean="0"/>
+              <a:t> about Money on the Bench (third link in your Google search for money on the bench). </a:t>
+            </a:r>
+            <a:r>
+              <a:rPr lang="en-US" dirty="0" smtClean="0"/>
+              <a:t>Note the </a:t>
+            </a:r>
+            <a:r>
+              <a:rPr lang="en-US" smtClean="0"/>
+              <a:t>process.</a:t>
+            </a:r>
+            <a:endParaRPr lang="en-US" dirty="0" smtClean="0"/>
+          </a:p>
+          <a:p>
+            <a:r>
+              <a:rPr lang="en-US" dirty="0" smtClean="0"/>
+              <a:t>Update your forked course repository. Hint: Google “update forked repository” </a:t>
+            </a:r>
+          </a:p>
+          <a:p>
+            <a:endParaRPr lang="en-US" dirty="0"/>
+          </a:p>
+        </p:txBody>
+      </p:sp>
+    </p:spTree>
+    <p:extLst>
+      <p:ext uri="{BB962C8B-B14F-4D97-AF65-F5344CB8AC3E}">
+        <p14:creationId xmlns:p14="http://schemas.microsoft.com/office/powerpoint/2010/main" val="4090532089"/>
       </p:ext>
     </p:extLst>
   </p:cSld>

</xml_diff>